<commit_message>
Update single processor figure
</commit_message>
<xml_diff>
--- a/single_processor.pptx
+++ b/single_processor.pptx
@@ -2,7 +2,7 @@
 <file path=ppt/presentation.xml><?xml version="1.0" encoding="utf-8"?>
 <p:presentation xmlns:a="http://schemas.openxmlformats.org/drawingml/2006/main" xmlns:r="http://schemas.openxmlformats.org/officeDocument/2006/relationships" xmlns:p="http://schemas.openxmlformats.org/presentationml/2006/main" saveSubsetFonts="1" autoCompressPictures="0">
   <p:sldMasterIdLst>
-    <p:sldMasterId id="2147483684" r:id="rId1"/>
+    <p:sldMasterId id="2147483696" r:id="rId1"/>
   </p:sldMasterIdLst>
   <p:notesMasterIdLst>
     <p:notesMasterId r:id="rId3"/>
@@ -10,7 +10,7 @@
   <p:sldIdLst>
     <p:sldId id="257" r:id="rId2"/>
   </p:sldIdLst>
-  <p:sldSz cx="3657600" cy="5486400"/>
+  <p:sldSz cx="3657600" cy="4572000"/>
   <p:notesSz cx="6858000" cy="9144000"/>
   <p:defaultTextStyle>
     <a:defPPr>
@@ -110,7 +110,7 @@
   <p:extLst>
     <p:ext uri="{EFAFB233-063F-42B5-8137-9DF3F51BA10A}">
       <p15:sldGuideLst xmlns:p15="http://schemas.microsoft.com/office/powerpoint/2012/main">
-        <p15:guide id="1" orient="horz" pos="1728" userDrawn="1">
+        <p15:guide id="1" orient="horz" pos="1440" userDrawn="1">
           <p15:clr>
             <a:srgbClr val="A4A3A4"/>
           </p15:clr>
@@ -226,8 +226,8 @@
         </p:nvSpPr>
         <p:spPr>
           <a:xfrm>
-            <a:off x="2400300" y="1143000"/>
-            <a:ext cx="2057400" cy="3086100"/>
+            <a:off x="2195513" y="1143000"/>
+            <a:ext cx="2466975" cy="3086100"/>
           </a:xfrm>
           <a:prstGeom prst="rect">
             <a:avLst/>
@@ -505,8 +505,8 @@
         </p:nvSpPr>
         <p:spPr>
           <a:xfrm>
-            <a:off x="2400300" y="1143000"/>
-            <a:ext cx="2057400" cy="3086100"/>
+            <a:off x="2195513" y="1143000"/>
+            <a:ext cx="2466975" cy="3086100"/>
           </a:xfrm>
         </p:spPr>
       </p:sp>
@@ -594,8 +594,8 @@
         </p:nvSpPr>
         <p:spPr>
           <a:xfrm>
-            <a:off x="274320" y="897890"/>
-            <a:ext cx="3108960" cy="1910080"/>
+            <a:off x="274320" y="748242"/>
+            <a:ext cx="3108960" cy="1591733"/>
           </a:xfrm>
         </p:spPr>
         <p:txBody>
@@ -626,8 +626,8 @@
         </p:nvSpPr>
         <p:spPr>
           <a:xfrm>
-            <a:off x="457200" y="2881630"/>
-            <a:ext cx="2743200" cy="1324610"/>
+            <a:off x="457200" y="2401359"/>
+            <a:ext cx="2743200" cy="1103841"/>
           </a:xfrm>
         </p:spPr>
         <p:txBody>
@@ -747,7 +747,7 @@
     </p:spTree>
     <p:extLst>
       <p:ext uri="{BB962C8B-B14F-4D97-AF65-F5344CB8AC3E}">
-        <p14:creationId xmlns:p14="http://schemas.microsoft.com/office/powerpoint/2010/main" val="1710917250"/>
+        <p14:creationId xmlns:p14="http://schemas.microsoft.com/office/powerpoint/2010/main" val="1586095222"/>
       </p:ext>
     </p:extLst>
   </p:cSld>
@@ -917,7 +917,7 @@
     </p:spTree>
     <p:extLst>
       <p:ext uri="{BB962C8B-B14F-4D97-AF65-F5344CB8AC3E}">
-        <p14:creationId xmlns:p14="http://schemas.microsoft.com/office/powerpoint/2010/main" val="1307517864"/>
+        <p14:creationId xmlns:p14="http://schemas.microsoft.com/office/powerpoint/2010/main" val="1329772305"/>
       </p:ext>
     </p:extLst>
   </p:cSld>
@@ -956,8 +956,8 @@
         </p:nvSpPr>
         <p:spPr>
           <a:xfrm>
-            <a:off x="2617470" y="292100"/>
-            <a:ext cx="788670" cy="4649470"/>
+            <a:off x="2617470" y="243417"/>
+            <a:ext cx="788670" cy="3874559"/>
           </a:xfrm>
         </p:spPr>
         <p:txBody>
@@ -984,8 +984,8 @@
         </p:nvSpPr>
         <p:spPr>
           <a:xfrm>
-            <a:off x="251460" y="292100"/>
-            <a:ext cx="2320290" cy="4649470"/>
+            <a:off x="251460" y="243417"/>
+            <a:ext cx="2320290" cy="3874559"/>
           </a:xfrm>
         </p:spPr>
         <p:txBody>
@@ -1097,7 +1097,7 @@
     </p:spTree>
     <p:extLst>
       <p:ext uri="{BB962C8B-B14F-4D97-AF65-F5344CB8AC3E}">
-        <p14:creationId xmlns:p14="http://schemas.microsoft.com/office/powerpoint/2010/main" val="252580497"/>
+        <p14:creationId xmlns:p14="http://schemas.microsoft.com/office/powerpoint/2010/main" val="620815806"/>
       </p:ext>
     </p:extLst>
   </p:cSld>
@@ -1267,7 +1267,7 @@
     </p:spTree>
     <p:extLst>
       <p:ext uri="{BB962C8B-B14F-4D97-AF65-F5344CB8AC3E}">
-        <p14:creationId xmlns:p14="http://schemas.microsoft.com/office/powerpoint/2010/main" val="580187420"/>
+        <p14:creationId xmlns:p14="http://schemas.microsoft.com/office/powerpoint/2010/main" val="787885943"/>
       </p:ext>
     </p:extLst>
   </p:cSld>
@@ -1306,8 +1306,8 @@
         </p:nvSpPr>
         <p:spPr>
           <a:xfrm>
-            <a:off x="249555" y="1367791"/>
-            <a:ext cx="3154680" cy="2282190"/>
+            <a:off x="249555" y="1139826"/>
+            <a:ext cx="3154680" cy="1901825"/>
           </a:xfrm>
         </p:spPr>
         <p:txBody>
@@ -1338,8 +1338,8 @@
         </p:nvSpPr>
         <p:spPr>
           <a:xfrm>
-            <a:off x="249555" y="3671571"/>
-            <a:ext cx="3154680" cy="1200150"/>
+            <a:off x="249555" y="3059643"/>
+            <a:ext cx="3154680" cy="1000125"/>
           </a:xfrm>
         </p:spPr>
         <p:txBody>
@@ -1511,7 +1511,7 @@
     </p:spTree>
     <p:extLst>
       <p:ext uri="{BB962C8B-B14F-4D97-AF65-F5344CB8AC3E}">
-        <p14:creationId xmlns:p14="http://schemas.microsoft.com/office/powerpoint/2010/main" val="1634210560"/>
+        <p14:creationId xmlns:p14="http://schemas.microsoft.com/office/powerpoint/2010/main" val="614876599"/>
       </p:ext>
     </p:extLst>
   </p:cSld>
@@ -1573,8 +1573,8 @@
         </p:nvSpPr>
         <p:spPr>
           <a:xfrm>
-            <a:off x="251460" y="1460500"/>
-            <a:ext cx="1554480" cy="3481070"/>
+            <a:off x="251460" y="1217083"/>
+            <a:ext cx="1554480" cy="2900892"/>
           </a:xfrm>
         </p:spPr>
         <p:txBody>
@@ -1630,8 +1630,8 @@
         </p:nvSpPr>
         <p:spPr>
           <a:xfrm>
-            <a:off x="1851660" y="1460500"/>
-            <a:ext cx="1554480" cy="3481070"/>
+            <a:off x="1851660" y="1217083"/>
+            <a:ext cx="1554480" cy="2900892"/>
           </a:xfrm>
         </p:spPr>
         <p:txBody>
@@ -1743,7 +1743,7 @@
     </p:spTree>
     <p:extLst>
       <p:ext uri="{BB962C8B-B14F-4D97-AF65-F5344CB8AC3E}">
-        <p14:creationId xmlns:p14="http://schemas.microsoft.com/office/powerpoint/2010/main" val="2008520437"/>
+        <p14:creationId xmlns:p14="http://schemas.microsoft.com/office/powerpoint/2010/main" val="539690029"/>
       </p:ext>
     </p:extLst>
   </p:cSld>
@@ -1782,8 +1782,8 @@
         </p:nvSpPr>
         <p:spPr>
           <a:xfrm>
-            <a:off x="251936" y="292101"/>
-            <a:ext cx="3154680" cy="1060450"/>
+            <a:off x="251936" y="243418"/>
+            <a:ext cx="3154680" cy="883709"/>
           </a:xfrm>
         </p:spPr>
         <p:txBody>
@@ -1810,8 +1810,8 @@
         </p:nvSpPr>
         <p:spPr>
           <a:xfrm>
-            <a:off x="251937" y="1344930"/>
-            <a:ext cx="1547336" cy="659130"/>
+            <a:off x="251937" y="1120775"/>
+            <a:ext cx="1547336" cy="549275"/>
           </a:xfrm>
         </p:spPr>
         <p:txBody>
@@ -1875,8 +1875,8 @@
         </p:nvSpPr>
         <p:spPr>
           <a:xfrm>
-            <a:off x="251937" y="2004060"/>
-            <a:ext cx="1547336" cy="2947670"/>
+            <a:off x="251937" y="1670050"/>
+            <a:ext cx="1547336" cy="2456392"/>
           </a:xfrm>
         </p:spPr>
         <p:txBody>
@@ -1932,8 +1932,8 @@
         </p:nvSpPr>
         <p:spPr>
           <a:xfrm>
-            <a:off x="1851660" y="1344930"/>
-            <a:ext cx="1554956" cy="659130"/>
+            <a:off x="1851660" y="1120775"/>
+            <a:ext cx="1554956" cy="549275"/>
           </a:xfrm>
         </p:spPr>
         <p:txBody>
@@ -1997,8 +1997,8 @@
         </p:nvSpPr>
         <p:spPr>
           <a:xfrm>
-            <a:off x="1851660" y="2004060"/>
-            <a:ext cx="1554956" cy="2947670"/>
+            <a:off x="1851660" y="1670050"/>
+            <a:ext cx="1554956" cy="2456392"/>
           </a:xfrm>
         </p:spPr>
         <p:txBody>
@@ -2110,7 +2110,7 @@
     </p:spTree>
     <p:extLst>
       <p:ext uri="{BB962C8B-B14F-4D97-AF65-F5344CB8AC3E}">
-        <p14:creationId xmlns:p14="http://schemas.microsoft.com/office/powerpoint/2010/main" val="907537466"/>
+        <p14:creationId xmlns:p14="http://schemas.microsoft.com/office/powerpoint/2010/main" val="1746876122"/>
       </p:ext>
     </p:extLst>
   </p:cSld>
@@ -2228,7 +2228,7 @@
     </p:spTree>
     <p:extLst>
       <p:ext uri="{BB962C8B-B14F-4D97-AF65-F5344CB8AC3E}">
-        <p14:creationId xmlns:p14="http://schemas.microsoft.com/office/powerpoint/2010/main" val="1553330068"/>
+        <p14:creationId xmlns:p14="http://schemas.microsoft.com/office/powerpoint/2010/main" val="1498044317"/>
       </p:ext>
     </p:extLst>
   </p:cSld>
@@ -2323,7 +2323,7 @@
     </p:spTree>
     <p:extLst>
       <p:ext uri="{BB962C8B-B14F-4D97-AF65-F5344CB8AC3E}">
-        <p14:creationId xmlns:p14="http://schemas.microsoft.com/office/powerpoint/2010/main" val="2007239944"/>
+        <p14:creationId xmlns:p14="http://schemas.microsoft.com/office/powerpoint/2010/main" val="532558391"/>
       </p:ext>
     </p:extLst>
   </p:cSld>
@@ -2362,8 +2362,8 @@
         </p:nvSpPr>
         <p:spPr>
           <a:xfrm>
-            <a:off x="251937" y="365760"/>
-            <a:ext cx="1179671" cy="1280160"/>
+            <a:off x="251937" y="304800"/>
+            <a:ext cx="1179671" cy="1066800"/>
           </a:xfrm>
         </p:spPr>
         <p:txBody>
@@ -2394,8 +2394,8 @@
         </p:nvSpPr>
         <p:spPr>
           <a:xfrm>
-            <a:off x="1554956" y="789941"/>
-            <a:ext cx="1851660" cy="3898900"/>
+            <a:off x="1554956" y="658285"/>
+            <a:ext cx="1851660" cy="3249083"/>
           </a:xfrm>
         </p:spPr>
         <p:txBody>
@@ -2479,8 +2479,8 @@
         </p:nvSpPr>
         <p:spPr>
           <a:xfrm>
-            <a:off x="251937" y="1645920"/>
-            <a:ext cx="1179671" cy="3049270"/>
+            <a:off x="251937" y="1371600"/>
+            <a:ext cx="1179671" cy="2541059"/>
           </a:xfrm>
         </p:spPr>
         <p:txBody>
@@ -2600,7 +2600,7 @@
     </p:spTree>
     <p:extLst>
       <p:ext uri="{BB962C8B-B14F-4D97-AF65-F5344CB8AC3E}">
-        <p14:creationId xmlns:p14="http://schemas.microsoft.com/office/powerpoint/2010/main" val="861128085"/>
+        <p14:creationId xmlns:p14="http://schemas.microsoft.com/office/powerpoint/2010/main" val="2144520488"/>
       </p:ext>
     </p:extLst>
   </p:cSld>
@@ -2639,8 +2639,8 @@
         </p:nvSpPr>
         <p:spPr>
           <a:xfrm>
-            <a:off x="251937" y="365760"/>
-            <a:ext cx="1179671" cy="1280160"/>
+            <a:off x="251937" y="304800"/>
+            <a:ext cx="1179671" cy="1066800"/>
           </a:xfrm>
         </p:spPr>
         <p:txBody>
@@ -2671,8 +2671,8 @@
         </p:nvSpPr>
         <p:spPr>
           <a:xfrm>
-            <a:off x="1554956" y="789941"/>
-            <a:ext cx="1851660" cy="3898900"/>
+            <a:off x="1554956" y="658285"/>
+            <a:ext cx="1851660" cy="3249083"/>
           </a:xfrm>
         </p:spPr>
         <p:txBody>
@@ -2736,8 +2736,8 @@
         </p:nvSpPr>
         <p:spPr>
           <a:xfrm>
-            <a:off x="251937" y="1645920"/>
-            <a:ext cx="1179671" cy="3049270"/>
+            <a:off x="251937" y="1371600"/>
+            <a:ext cx="1179671" cy="2541059"/>
           </a:xfrm>
         </p:spPr>
         <p:txBody>
@@ -2857,7 +2857,7 @@
     </p:spTree>
     <p:extLst>
       <p:ext uri="{BB962C8B-B14F-4D97-AF65-F5344CB8AC3E}">
-        <p14:creationId xmlns:p14="http://schemas.microsoft.com/office/powerpoint/2010/main" val="1087427462"/>
+        <p14:creationId xmlns:p14="http://schemas.microsoft.com/office/powerpoint/2010/main" val="1737794215"/>
       </p:ext>
     </p:extLst>
   </p:cSld>
@@ -2901,8 +2901,8 @@
         </p:nvSpPr>
         <p:spPr>
           <a:xfrm>
-            <a:off x="251460" y="292101"/>
-            <a:ext cx="3154680" cy="1060450"/>
+            <a:off x="251460" y="243418"/>
+            <a:ext cx="3154680" cy="883709"/>
           </a:xfrm>
           <a:prstGeom prst="rect">
             <a:avLst/>
@@ -2934,8 +2934,8 @@
         </p:nvSpPr>
         <p:spPr>
           <a:xfrm>
-            <a:off x="251460" y="1460500"/>
-            <a:ext cx="3154680" cy="3481070"/>
+            <a:off x="251460" y="1217083"/>
+            <a:ext cx="3154680" cy="2900892"/>
           </a:xfrm>
           <a:prstGeom prst="rect">
             <a:avLst/>
@@ -2996,8 +2996,8 @@
         </p:nvSpPr>
         <p:spPr>
           <a:xfrm>
-            <a:off x="251460" y="5085081"/>
-            <a:ext cx="822960" cy="292100"/>
+            <a:off x="251460" y="4237568"/>
+            <a:ext cx="822960" cy="243417"/>
           </a:xfrm>
           <a:prstGeom prst="rect">
             <a:avLst/>
@@ -3037,8 +3037,8 @@
         </p:nvSpPr>
         <p:spPr>
           <a:xfrm>
-            <a:off x="1211580" y="5085081"/>
-            <a:ext cx="1234440" cy="292100"/>
+            <a:off x="1211580" y="4237568"/>
+            <a:ext cx="1234440" cy="243417"/>
           </a:xfrm>
           <a:prstGeom prst="rect">
             <a:avLst/>
@@ -3074,8 +3074,8 @@
         </p:nvSpPr>
         <p:spPr>
           <a:xfrm>
-            <a:off x="2583180" y="5085081"/>
-            <a:ext cx="822960" cy="292100"/>
+            <a:off x="2583180" y="4237568"/>
+            <a:ext cx="822960" cy="243417"/>
           </a:xfrm>
           <a:prstGeom prst="rect">
             <a:avLst/>
@@ -3106,23 +3106,23 @@
     </p:spTree>
     <p:extLst>
       <p:ext uri="{BB962C8B-B14F-4D97-AF65-F5344CB8AC3E}">
-        <p14:creationId xmlns:p14="http://schemas.microsoft.com/office/powerpoint/2010/main" val="109220084"/>
+        <p14:creationId xmlns:p14="http://schemas.microsoft.com/office/powerpoint/2010/main" val="620177559"/>
       </p:ext>
     </p:extLst>
   </p:cSld>
   <p:clrMap bg1="lt1" tx1="dk1" bg2="lt2" tx2="dk2" accent1="accent1" accent2="accent2" accent3="accent3" accent4="accent4" accent5="accent5" accent6="accent6" hlink="hlink" folHlink="folHlink"/>
   <p:sldLayoutIdLst>
-    <p:sldLayoutId id="2147483685" r:id="rId1"/>
-    <p:sldLayoutId id="2147483686" r:id="rId2"/>
-    <p:sldLayoutId id="2147483687" r:id="rId3"/>
-    <p:sldLayoutId id="2147483688" r:id="rId4"/>
-    <p:sldLayoutId id="2147483689" r:id="rId5"/>
-    <p:sldLayoutId id="2147483690" r:id="rId6"/>
-    <p:sldLayoutId id="2147483691" r:id="rId7"/>
-    <p:sldLayoutId id="2147483692" r:id="rId8"/>
-    <p:sldLayoutId id="2147483693" r:id="rId9"/>
-    <p:sldLayoutId id="2147483694" r:id="rId10"/>
-    <p:sldLayoutId id="2147483695" r:id="rId11"/>
+    <p:sldLayoutId id="2147483697" r:id="rId1"/>
+    <p:sldLayoutId id="2147483698" r:id="rId2"/>
+    <p:sldLayoutId id="2147483699" r:id="rId3"/>
+    <p:sldLayoutId id="2147483700" r:id="rId4"/>
+    <p:sldLayoutId id="2147483701" r:id="rId5"/>
+    <p:sldLayoutId id="2147483702" r:id="rId6"/>
+    <p:sldLayoutId id="2147483703" r:id="rId7"/>
+    <p:sldLayoutId id="2147483704" r:id="rId8"/>
+    <p:sldLayoutId id="2147483705" r:id="rId9"/>
+    <p:sldLayoutId id="2147483706" r:id="rId10"/>
+    <p:sldLayoutId id="2147483707" r:id="rId11"/>
   </p:sldLayoutIdLst>
   <p:txStyles>
     <p:titleStyle>
@@ -3432,7 +3432,7 @@
         </p:nvSpPr>
         <p:spPr>
           <a:xfrm>
-            <a:off x="2213359" y="1973502"/>
+            <a:off x="2213359" y="1858366"/>
             <a:ext cx="533400" cy="533399"/>
           </a:xfrm>
           <a:prstGeom prst="downArrow">
@@ -3475,8 +3475,8 @@
         </p:nvSpPr>
         <p:spPr>
           <a:xfrm>
-            <a:off x="1375159" y="2621198"/>
-            <a:ext cx="2286000" cy="2133600"/>
+            <a:off x="1418094" y="2413072"/>
+            <a:ext cx="2169763" cy="1848962"/>
           </a:xfrm>
           <a:prstGeom prst="roundRect">
             <a:avLst/>
@@ -3581,7 +3581,7 @@
         </p:nvSpPr>
         <p:spPr>
           <a:xfrm>
-            <a:off x="1704360" y="4871631"/>
+            <a:off x="1673365" y="4206306"/>
             <a:ext cx="1820819" cy="369332"/>
           </a:xfrm>
           <a:prstGeom prst="rect">
@@ -3599,7 +3599,6 @@
               <a:rPr lang="en-US" dirty="0"/>
               <a:t>10 GHz processor</a:t>
             </a:r>
-            <a:endParaRPr lang="en-US" dirty="0"/>
           </a:p>
         </p:txBody>
       </p:sp>
@@ -3611,7 +3610,7 @@
         </p:nvCxnSpPr>
         <p:spPr>
           <a:xfrm>
-            <a:off x="28444" y="3726098"/>
+            <a:off x="28444" y="3610961"/>
             <a:ext cx="1295400" cy="0"/>
           </a:xfrm>
           <a:prstGeom prst="straightConnector1">
@@ -3648,7 +3647,7 @@
         </p:nvSpPr>
         <p:spPr>
           <a:xfrm>
-            <a:off x="233941" y="3356766"/>
+            <a:off x="233942" y="3241629"/>
             <a:ext cx="950901" cy="369332"/>
           </a:xfrm>
           <a:prstGeom prst="rect">
@@ -3668,9 +3667,6 @@
               </a:rPr>
               <a:t>Packets</a:t>
             </a:r>
-            <a:endParaRPr lang="en-US" dirty="0">
-              <a:latin typeface="Gadugi" panose="020B0502040204020203" pitchFamily="34" charset="0"/>
-            </a:endParaRPr>
           </a:p>
         </p:txBody>
       </p:sp>
@@ -3682,7 +3678,7 @@
         </p:nvGrpSpPr>
         <p:grpSpPr>
           <a:xfrm>
-            <a:off x="1832361" y="106598"/>
+            <a:off x="1832362" y="-8539"/>
             <a:ext cx="1310557" cy="1828800"/>
             <a:chOff x="1780113" y="3029339"/>
             <a:chExt cx="1310557" cy="2761861"/>
@@ -3697,7 +3693,7 @@
           <p:spPr>
             <a:xfrm>
               <a:off x="1824947" y="3086878"/>
-              <a:ext cx="1109765" cy="2704322"/>
+              <a:ext cx="1168221" cy="2704322"/>
             </a:xfrm>
             <a:prstGeom prst="rect">
               <a:avLst/>
@@ -4631,13 +4627,6 @@
                 </a:rPr>
                 <a:t>match/action</a:t>
               </a:r>
-              <a:endParaRPr lang="en-US" sz="1400" dirty="0">
-                <a:solidFill>
-                  <a:srgbClr val="000000"/>
-                </a:solidFill>
-                <a:latin typeface="Gadugi" panose="020B0502040204020203" pitchFamily="34" charset="0"/>
-                <a:cs typeface="Seravek"/>
-              </a:endParaRPr>
             </a:p>
           </p:txBody>
         </p:sp>
@@ -4652,11 +4641,11 @@
   <p:clrMapOvr>
     <a:masterClrMapping/>
   </p:clrMapOvr>
-  <mc:AlternateContent xmlns:mc="http://schemas.openxmlformats.org/markup-compatibility/2006">
-    <mc:Choice xmlns:p14="http://schemas.microsoft.com/office/powerpoint/2010/main" Requires="p14">
+  <mc:AlternateContent xmlns:mc="http://schemas.openxmlformats.org/markup-compatibility/2006" xmlns:p14="http://schemas.microsoft.com/office/powerpoint/2010/main">
+    <mc:Choice Requires="p14">
       <p:transition spd="slow" p14:dur="2000"/>
     </mc:Choice>
-    <mc:Fallback>
+    <mc:Fallback xmlns="">
       <p:transition spd="slow"/>
     </mc:Fallback>
   </mc:AlternateContent>

</xml_diff>